<commit_message>
mod 13 dovysvetlenie virtualizácie
</commit_message>
<xml_diff>
--- a/ENSA_Module_13.pptx
+++ b/ENSA_Module_13.pptx
@@ -237,7 +237,7 @@
 <file path=ppt/revisionInfo.xml><?xml version="1.0" encoding="utf-8"?>
 <p1510:revInfo xmlns:a="http://schemas.openxmlformats.org/drawingml/2006/main" xmlns:r="http://schemas.openxmlformats.org/officeDocument/2006/relationships" xmlns:p1510="http://schemas.microsoft.com/office/powerpoint/2015/10/main">
   <p1510:revLst>
-    <p1510:client id="{D67B7C04-1572-EC42-AC10-D95911A5DAE5}" v="2" dt="2024-11-21T07:31:56.476"/>
+    <p1510:client id="{3F9C5AFD-44B5-264D-8824-1A64337AC530}" v="6" dt="2025-11-06T08:42:13.030"/>
   </p1510:revLst>
 </p1510:revInfo>
 </file>
@@ -245,394 +245,80 @@
 <file path=ppt/changesInfos/changesInfo1.xml><?xml version="1.0" encoding="utf-8"?>
 <pc:chgInfo xmlns:a="http://schemas.openxmlformats.org/drawingml/2006/main" xmlns:r="http://schemas.openxmlformats.org/officeDocument/2006/relationships" xmlns:ac="http://schemas.microsoft.com/office/drawing/2013/main/command" xmlns:pc="http://schemas.microsoft.com/office/powerpoint/2013/main/command">
   <pc:docChgLst>
-    <pc:chgData name="Július Baráth" userId="e650c4ab-697e-4750-bd58-c1531aabce95" providerId="ADAL" clId="{DE7C706E-4BF4-C04F-B64A-0F24B87B2698}"/>
+    <pc:chgData name="Baráth, Július" userId="aebde9b9-dccc-4475-a9ac-c05e78323d7a" providerId="ADAL" clId="{4A0811C8-ED2F-505E-B787-C8270CED5046}"/>
     <pc:docChg chg="custSel modSld">
-      <pc:chgData name="Július Baráth" userId="e650c4ab-697e-4750-bd58-c1531aabce95" providerId="ADAL" clId="{DE7C706E-4BF4-C04F-B64A-0F24B87B2698}" dt="2022-12-01T08:30:18.397" v="50" actId="20577"/>
+      <pc:chgData name="Baráth, Július" userId="aebde9b9-dccc-4475-a9ac-c05e78323d7a" providerId="ADAL" clId="{4A0811C8-ED2F-505E-B787-C8270CED5046}" dt="2025-11-06T08:43:03.090" v="132" actId="403"/>
       <pc:docMkLst>
         <pc:docMk/>
       </pc:docMkLst>
       <pc:sldChg chg="modSp mod">
-        <pc:chgData name="Július Baráth" userId="e650c4ab-697e-4750-bd58-c1531aabce95" providerId="ADAL" clId="{DE7C706E-4BF4-C04F-B64A-0F24B87B2698}" dt="2022-12-01T07:20:48.997" v="5" actId="27636"/>
+        <pc:chgData name="Baráth, Július" userId="aebde9b9-dccc-4475-a9ac-c05e78323d7a" providerId="ADAL" clId="{4A0811C8-ED2F-505E-B787-C8270CED5046}" dt="2025-11-06T08:20:51.592" v="37" actId="20577"/>
         <pc:sldMkLst>
           <pc:docMk/>
-          <pc:sldMk cId="175850698" sldId="1187"/>
+          <pc:sldMk cId="2189838388" sldId="1282"/>
         </pc:sldMkLst>
+        <pc:spChg chg="mod">
+          <ac:chgData name="Baráth, Július" userId="aebde9b9-dccc-4475-a9ac-c05e78323d7a" providerId="ADAL" clId="{4A0811C8-ED2F-505E-B787-C8270CED5046}" dt="2025-11-06T08:20:51.592" v="37" actId="20577"/>
+          <ac:spMkLst>
+            <pc:docMk/>
+            <pc:sldMk cId="2189838388" sldId="1282"/>
+            <ac:spMk id="5" creationId="{9CE6D849-1F60-FA42-85BD-10F641257768}"/>
+          </ac:spMkLst>
+        </pc:spChg>
       </pc:sldChg>
       <pc:sldChg chg="addSp modSp mod">
-        <pc:chgData name="Július Baráth" userId="e650c4ab-697e-4750-bd58-c1531aabce95" providerId="ADAL" clId="{DE7C706E-4BF4-C04F-B64A-0F24B87B2698}" dt="2022-12-01T07:51:47.738" v="42" actId="1076"/>
+        <pc:chgData name="Baráth, Július" userId="aebde9b9-dccc-4475-a9ac-c05e78323d7a" providerId="ADAL" clId="{4A0811C8-ED2F-505E-B787-C8270CED5046}" dt="2025-11-06T08:25:00.231" v="100" actId="114"/>
         <pc:sldMkLst>
           <pc:docMk/>
-          <pc:sldMk cId="4215459012" sldId="1189"/>
+          <pc:sldMk cId="2497983819" sldId="1284"/>
         </pc:sldMkLst>
+        <pc:spChg chg="add mod">
+          <ac:chgData name="Baráth, Július" userId="aebde9b9-dccc-4475-a9ac-c05e78323d7a" providerId="ADAL" clId="{4A0811C8-ED2F-505E-B787-C8270CED5046}" dt="2025-11-06T08:19:54.897" v="34" actId="208"/>
+          <ac:spMkLst>
+            <pc:docMk/>
+            <pc:sldMk cId="2497983819" sldId="1284"/>
+            <ac:spMk id="2" creationId="{5E387964-7AD4-E343-04B4-07CA40FB197F}"/>
+          </ac:spMkLst>
+        </pc:spChg>
+        <pc:spChg chg="add mod">
+          <ac:chgData name="Baráth, Július" userId="aebde9b9-dccc-4475-a9ac-c05e78323d7a" providerId="ADAL" clId="{4A0811C8-ED2F-505E-B787-C8270CED5046}" dt="2025-11-06T08:25:00.231" v="100" actId="114"/>
+          <ac:spMkLst>
+            <pc:docMk/>
+            <pc:sldMk cId="2497983819" sldId="1284"/>
+            <ac:spMk id="10" creationId="{68AA0D44-1EA9-1DEE-A8AC-0F77623B4A55}"/>
+          </ac:spMkLst>
+        </pc:spChg>
+        <pc:cxnChg chg="add mod">
+          <ac:chgData name="Baráth, Július" userId="aebde9b9-dccc-4475-a9ac-c05e78323d7a" providerId="ADAL" clId="{4A0811C8-ED2F-505E-B787-C8270CED5046}" dt="2025-11-06T08:20:08.978" v="35" actId="11529"/>
+          <ac:cxnSpMkLst>
+            <pc:docMk/>
+            <pc:sldMk cId="2497983819" sldId="1284"/>
+            <ac:cxnSpMk id="6" creationId="{A4620A5F-2882-DE8B-ED5A-CB4A275EC1F8}"/>
+          </ac:cxnSpMkLst>
+        </pc:cxnChg>
+        <pc:cxnChg chg="add">
+          <ac:chgData name="Baráth, Július" userId="aebde9b9-dccc-4475-a9ac-c05e78323d7a" providerId="ADAL" clId="{4A0811C8-ED2F-505E-B787-C8270CED5046}" dt="2025-11-06T08:20:21.971" v="36" actId="11529"/>
+          <ac:cxnSpMkLst>
+            <pc:docMk/>
+            <pc:sldMk cId="2497983819" sldId="1284"/>
+            <ac:cxnSpMk id="9" creationId="{08D02B1F-F53F-4ACB-3DE0-59DDA2D6B4D2}"/>
+          </ac:cxnSpMkLst>
+        </pc:cxnChg>
       </pc:sldChg>
       <pc:sldChg chg="modSp mod">
-        <pc:chgData name="Július Baráth" userId="e650c4ab-697e-4750-bd58-c1531aabce95" providerId="ADAL" clId="{DE7C706E-4BF4-C04F-B64A-0F24B87B2698}" dt="2022-12-01T07:17:33.337" v="2" actId="113"/>
-        <pc:sldMkLst>
-          <pc:docMk/>
-          <pc:sldMk cId="2909698909" sldId="1280"/>
-        </pc:sldMkLst>
-      </pc:sldChg>
-      <pc:sldChg chg="addSp delSp modSp mod">
-        <pc:chgData name="Július Baráth" userId="e650c4ab-697e-4750-bd58-c1531aabce95" providerId="ADAL" clId="{DE7C706E-4BF4-C04F-B64A-0F24B87B2698}" dt="2022-12-01T07:51:39.694" v="40" actId="1076"/>
-        <pc:sldMkLst>
-          <pc:docMk/>
-          <pc:sldMk cId="33433203" sldId="1286"/>
-        </pc:sldMkLst>
-      </pc:sldChg>
-      <pc:sldChg chg="modSp mod">
-        <pc:chgData name="Július Baráth" userId="e650c4ab-697e-4750-bd58-c1531aabce95" providerId="ADAL" clId="{DE7C706E-4BF4-C04F-B64A-0F24B87B2698}" dt="2022-12-01T07:52:47.414" v="43" actId="113"/>
-        <pc:sldMkLst>
-          <pc:docMk/>
-          <pc:sldMk cId="102689552" sldId="1290"/>
-        </pc:sldMkLst>
-      </pc:sldChg>
-      <pc:sldChg chg="modSp mod">
-        <pc:chgData name="Július Baráth" userId="e650c4ab-697e-4750-bd58-c1531aabce95" providerId="ADAL" clId="{DE7C706E-4BF4-C04F-B64A-0F24B87B2698}" dt="2022-12-01T08:23:02.598" v="45" actId="115"/>
+        <pc:chgData name="Baráth, Július" userId="aebde9b9-dccc-4475-a9ac-c05e78323d7a" providerId="ADAL" clId="{4A0811C8-ED2F-505E-B787-C8270CED5046}" dt="2025-11-06T08:43:03.090" v="132" actId="403"/>
         <pc:sldMkLst>
           <pc:docMk/>
           <pc:sldMk cId="1586999348" sldId="1295"/>
         </pc:sldMkLst>
-      </pc:sldChg>
-      <pc:sldChg chg="modSp mod">
-        <pc:chgData name="Július Baráth" userId="e650c4ab-697e-4750-bd58-c1531aabce95" providerId="ADAL" clId="{DE7C706E-4BF4-C04F-B64A-0F24B87B2698}" dt="2022-12-01T08:26:10.941" v="48" actId="20577"/>
-        <pc:sldMkLst>
-          <pc:docMk/>
-          <pc:sldMk cId="4128211422" sldId="1297"/>
-        </pc:sldMkLst>
-      </pc:sldChg>
-      <pc:sldChg chg="modSp mod">
-        <pc:chgData name="Július Baráth" userId="e650c4ab-697e-4750-bd58-c1531aabce95" providerId="ADAL" clId="{DE7C706E-4BF4-C04F-B64A-0F24B87B2698}" dt="2022-12-01T08:30:18.397" v="50" actId="20577"/>
-        <pc:sldMkLst>
-          <pc:docMk/>
-          <pc:sldMk cId="1873411540" sldId="1300"/>
-        </pc:sldMkLst>
-      </pc:sldChg>
-    </pc:docChg>
-  </pc:docChgLst>
-  <pc:docChgLst>
-    <pc:chgData name="Baráth, Július" userId="aebde9b9-dccc-4475-a9ac-c05e78323d7a" providerId="ADAL" clId="{D67B7C04-1572-EC42-AC10-D95911A5DAE5}"/>
-    <pc:docChg chg="undo custSel modSld">
-      <pc:chgData name="Baráth, Július" userId="aebde9b9-dccc-4475-a9ac-c05e78323d7a" providerId="ADAL" clId="{D67B7C04-1572-EC42-AC10-D95911A5DAE5}" dt="2024-11-21T07:41:18.690" v="31" actId="113"/>
-      <pc:docMkLst>
-        <pc:docMk/>
-      </pc:docMkLst>
-      <pc:sldChg chg="modSp mod">
-        <pc:chgData name="Baráth, Július" userId="aebde9b9-dccc-4475-a9ac-c05e78323d7a" providerId="ADAL" clId="{D67B7C04-1572-EC42-AC10-D95911A5DAE5}" dt="2024-11-20T09:21:10.420" v="13" actId="20577"/>
-        <pc:sldMkLst>
-          <pc:docMk/>
-          <pc:sldMk cId="107226185" sldId="1281"/>
-        </pc:sldMkLst>
         <pc:spChg chg="mod">
-          <ac:chgData name="Baráth, Július" userId="aebde9b9-dccc-4475-a9ac-c05e78323d7a" providerId="ADAL" clId="{D67B7C04-1572-EC42-AC10-D95911A5DAE5}" dt="2024-11-20T09:21:10.420" v="13" actId="20577"/>
+          <ac:chgData name="Baráth, Július" userId="aebde9b9-dccc-4475-a9ac-c05e78323d7a" providerId="ADAL" clId="{4A0811C8-ED2F-505E-B787-C8270CED5046}" dt="2025-11-06T08:43:03.090" v="132" actId="403"/>
           <ac:spMkLst>
             <pc:docMk/>
-            <pc:sldMk cId="107226185" sldId="1281"/>
-            <ac:spMk id="4" creationId="{F6482918-386E-D34E-B045-91B5F35FF0B7}"/>
+            <pc:sldMk cId="1586999348" sldId="1295"/>
+            <ac:spMk id="5" creationId="{8D3751CD-2C7C-3F42-9743-9D1F6A9655ED}"/>
           </ac:spMkLst>
         </pc:spChg>
-      </pc:sldChg>
-      <pc:sldChg chg="modSp mod">
-        <pc:chgData name="Baráth, Július" userId="aebde9b9-dccc-4475-a9ac-c05e78323d7a" providerId="ADAL" clId="{D67B7C04-1572-EC42-AC10-D95911A5DAE5}" dt="2024-11-21T07:24:16.777" v="19"/>
-        <pc:sldMkLst>
-          <pc:docMk/>
-          <pc:sldMk cId="193425496" sldId="1292"/>
-        </pc:sldMkLst>
-        <pc:spChg chg="mod">
-          <ac:chgData name="Baráth, Július" userId="aebde9b9-dccc-4475-a9ac-c05e78323d7a" providerId="ADAL" clId="{D67B7C04-1572-EC42-AC10-D95911A5DAE5}" dt="2024-11-21T07:24:16.777" v="19"/>
-          <ac:spMkLst>
-            <pc:docMk/>
-            <pc:sldMk cId="193425496" sldId="1292"/>
-            <ac:spMk id="5" creationId="{4EFE983B-7A6A-8B49-91BE-FFDD4F5B433A}"/>
-          </ac:spMkLst>
-        </pc:spChg>
-      </pc:sldChg>
-      <pc:sldChg chg="addSp modSp mod">
-        <pc:chgData name="Baráth, Július" userId="aebde9b9-dccc-4475-a9ac-c05e78323d7a" providerId="ADAL" clId="{D67B7C04-1572-EC42-AC10-D95911A5DAE5}" dt="2024-11-21T07:32:08.827" v="30" actId="1076"/>
-        <pc:sldMkLst>
-          <pc:docMk/>
-          <pc:sldMk cId="4128211422" sldId="1297"/>
-        </pc:sldMkLst>
-        <pc:spChg chg="add mod">
-          <ac:chgData name="Baráth, Július" userId="aebde9b9-dccc-4475-a9ac-c05e78323d7a" providerId="ADAL" clId="{D67B7C04-1572-EC42-AC10-D95911A5DAE5}" dt="2024-11-21T07:31:03.764" v="22" actId="1076"/>
-          <ac:spMkLst>
-            <pc:docMk/>
-            <pc:sldMk cId="4128211422" sldId="1297"/>
-            <ac:spMk id="2" creationId="{53043D13-53AC-E2D6-6A6B-9B22EDCB1E32}"/>
-          </ac:spMkLst>
-        </pc:spChg>
-        <pc:spChg chg="add mod">
-          <ac:chgData name="Baráth, Július" userId="aebde9b9-dccc-4475-a9ac-c05e78323d7a" providerId="ADAL" clId="{D67B7C04-1572-EC42-AC10-D95911A5DAE5}" dt="2024-11-21T07:32:08.827" v="30" actId="1076"/>
-          <ac:spMkLst>
-            <pc:docMk/>
-            <pc:sldMk cId="4128211422" sldId="1297"/>
-            <ac:spMk id="4" creationId="{99A27A9E-3F53-7E37-32D6-5F81727FA3AF}"/>
-          </ac:spMkLst>
-        </pc:spChg>
-      </pc:sldChg>
-      <pc:sldChg chg="modSp mod">
-        <pc:chgData name="Baráth, Július" userId="aebde9b9-dccc-4475-a9ac-c05e78323d7a" providerId="ADAL" clId="{D67B7C04-1572-EC42-AC10-D95911A5DAE5}" dt="2024-11-21T07:41:18.690" v="31" actId="113"/>
-        <pc:sldMkLst>
-          <pc:docMk/>
-          <pc:sldMk cId="4207381853" sldId="1302"/>
-        </pc:sldMkLst>
-        <pc:spChg chg="mod">
-          <ac:chgData name="Baráth, Július" userId="aebde9b9-dccc-4475-a9ac-c05e78323d7a" providerId="ADAL" clId="{D67B7C04-1572-EC42-AC10-D95911A5DAE5}" dt="2024-11-21T07:41:18.690" v="31" actId="113"/>
-          <ac:spMkLst>
-            <pc:docMk/>
-            <pc:sldMk cId="4207381853" sldId="1302"/>
-            <ac:spMk id="4" creationId="{DC1291EC-E56A-0E4B-BB0E-808FBBE00672}"/>
-          </ac:spMkLst>
-        </pc:spChg>
-      </pc:sldChg>
-    </pc:docChg>
-  </pc:docChgLst>
-  <pc:docChgLst>
-    <pc:chgData name="Baráth, Július" userId="aebde9b9-dccc-4475-a9ac-c05e78323d7a" providerId="ADAL" clId="{52DC149B-0958-194A-BDCC-BBA4375E3C1F}"/>
-    <pc:docChg chg="modSld sldOrd">
-      <pc:chgData name="Baráth, Július" userId="aebde9b9-dccc-4475-a9ac-c05e78323d7a" providerId="ADAL" clId="{52DC149B-0958-194A-BDCC-BBA4375E3C1F}" dt="2023-11-20T11:58:12.008" v="1" actId="20577"/>
-      <pc:docMkLst>
-        <pc:docMk/>
-      </pc:docMkLst>
-      <pc:sldChg chg="ord">
-        <pc:chgData name="Baráth, Július" userId="aebde9b9-dccc-4475-a9ac-c05e78323d7a" providerId="ADAL" clId="{52DC149B-0958-194A-BDCC-BBA4375E3C1F}" dt="2023-11-20T11:56:28.322" v="0" actId="20578"/>
-        <pc:sldMkLst>
-          <pc:docMk/>
-          <pc:sldMk cId="4215459012" sldId="1189"/>
-        </pc:sldMkLst>
-      </pc:sldChg>
-      <pc:sldChg chg="ord">
-        <pc:chgData name="Baráth, Július" userId="aebde9b9-dccc-4475-a9ac-c05e78323d7a" providerId="ADAL" clId="{52DC149B-0958-194A-BDCC-BBA4375E3C1F}" dt="2023-11-20T11:56:28.322" v="0" actId="20578"/>
-        <pc:sldMkLst>
-          <pc:docMk/>
-          <pc:sldMk cId="3653171170" sldId="1288"/>
-        </pc:sldMkLst>
-      </pc:sldChg>
-      <pc:sldChg chg="modSp mod">
-        <pc:chgData name="Baráth, Július" userId="aebde9b9-dccc-4475-a9ac-c05e78323d7a" providerId="ADAL" clId="{52DC149B-0958-194A-BDCC-BBA4375E3C1F}" dt="2023-11-20T11:58:12.008" v="1" actId="20577"/>
-        <pc:sldMkLst>
-          <pc:docMk/>
-          <pc:sldMk cId="102689552" sldId="1290"/>
-        </pc:sldMkLst>
-      </pc:sldChg>
-    </pc:docChg>
-  </pc:docChgLst>
-  <pc:docChgLst>
-    <pc:chgData name="Július Baráth" userId="e650c4ab-697e-4750-bd58-c1531aabce95" providerId="ADAL" clId="{5F96A8A5-7658-F740-99A3-479C3CA8D23D}"/>
-    <pc:docChg chg="delSld">
-      <pc:chgData name="Július Baráth" userId="e650c4ab-697e-4750-bd58-c1531aabce95" providerId="ADAL" clId="{5F96A8A5-7658-F740-99A3-479C3CA8D23D}" dt="2020-09-17T07:57:10.751" v="17" actId="2696"/>
-      <pc:docMkLst>
-        <pc:docMk/>
-      </pc:docMkLst>
-      <pc:sldChg chg="del">
-        <pc:chgData name="Július Baráth" userId="e650c4ab-697e-4750-bd58-c1531aabce95" providerId="ADAL" clId="{5F96A8A5-7658-F740-99A3-479C3CA8D23D}" dt="2020-09-17T07:54:39.436" v="0" actId="2696"/>
-        <pc:sldMkLst>
-          <pc:docMk/>
-          <pc:sldMk cId="343650477" sldId="513"/>
-        </pc:sldMkLst>
-      </pc:sldChg>
-      <pc:sldChg chg="del">
-        <pc:chgData name="Július Baráth" userId="e650c4ab-697e-4750-bd58-c1531aabce95" providerId="ADAL" clId="{5F96A8A5-7658-F740-99A3-479C3CA8D23D}" dt="2020-09-17T07:54:39.475" v="3" actId="2696"/>
-        <pc:sldMkLst>
-          <pc:docMk/>
-          <pc:sldMk cId="2145273728" sldId="763"/>
-        </pc:sldMkLst>
-      </pc:sldChg>
-      <pc:sldChg chg="del">
-        <pc:chgData name="Július Baráth" userId="e650c4ab-697e-4750-bd58-c1531aabce95" providerId="ADAL" clId="{5F96A8A5-7658-F740-99A3-479C3CA8D23D}" dt="2020-09-17T07:57:10.723" v="13" actId="2696"/>
-        <pc:sldMkLst>
-          <pc:docMk/>
-          <pc:sldMk cId="3271745509" sldId="874"/>
-        </pc:sldMkLst>
-      </pc:sldChg>
-      <pc:sldChg chg="del">
-        <pc:chgData name="Július Baráth" userId="e650c4ab-697e-4750-bd58-c1531aabce95" providerId="ADAL" clId="{5F96A8A5-7658-F740-99A3-479C3CA8D23D}" dt="2020-09-17T07:57:10.706" v="11" actId="2696"/>
-        <pc:sldMkLst>
-          <pc:docMk/>
-          <pc:sldMk cId="410599242" sldId="957"/>
-        </pc:sldMkLst>
-      </pc:sldChg>
-      <pc:sldChg chg="del">
-        <pc:chgData name="Július Baráth" userId="e650c4ab-697e-4750-bd58-c1531aabce95" providerId="ADAL" clId="{5F96A8A5-7658-F740-99A3-479C3CA8D23D}" dt="2020-09-17T07:54:39.461" v="2" actId="2696"/>
-        <pc:sldMkLst>
-          <pc:docMk/>
-          <pc:sldMk cId="2109317603" sldId="1052"/>
-        </pc:sldMkLst>
-      </pc:sldChg>
-      <pc:sldChg chg="del">
-        <pc:chgData name="Július Baráth" userId="e650c4ab-697e-4750-bd58-c1531aabce95" providerId="ADAL" clId="{5F96A8A5-7658-F740-99A3-479C3CA8D23D}" dt="2020-09-17T07:54:39.488" v="4" actId="2696"/>
-        <pc:sldMkLst>
-          <pc:docMk/>
-          <pc:sldMk cId="1129576059" sldId="1069"/>
-        </pc:sldMkLst>
-      </pc:sldChg>
-      <pc:sldChg chg="del">
-        <pc:chgData name="Július Baráth" userId="e650c4ab-697e-4750-bd58-c1531aabce95" providerId="ADAL" clId="{5F96A8A5-7658-F740-99A3-479C3CA8D23D}" dt="2020-09-17T07:54:43.477" v="8" actId="2696"/>
-        <pc:sldMkLst>
-          <pc:docMk/>
-          <pc:sldMk cId="3943937825" sldId="1108"/>
-        </pc:sldMkLst>
-      </pc:sldChg>
-      <pc:sldChg chg="del">
-        <pc:chgData name="Július Baráth" userId="e650c4ab-697e-4750-bd58-c1531aabce95" providerId="ADAL" clId="{5F96A8A5-7658-F740-99A3-479C3CA8D23D}" dt="2020-09-17T07:57:10.715" v="12" actId="2696"/>
-        <pc:sldMkLst>
-          <pc:docMk/>
-          <pc:sldMk cId="2929623157" sldId="1138"/>
-        </pc:sldMkLst>
-      </pc:sldChg>
-      <pc:sldChg chg="del">
-        <pc:chgData name="Július Baráth" userId="e650c4ab-697e-4750-bd58-c1531aabce95" providerId="ADAL" clId="{5F96A8A5-7658-F740-99A3-479C3CA8D23D}" dt="2020-09-17T07:56:01.269" v="9" actId="2696"/>
-        <pc:sldMkLst>
-          <pc:docMk/>
-          <pc:sldMk cId="1069385919" sldId="1194"/>
-        </pc:sldMkLst>
-      </pc:sldChg>
-      <pc:sldChg chg="del">
-        <pc:chgData name="Július Baráth" userId="e650c4ab-697e-4750-bd58-c1531aabce95" providerId="ADAL" clId="{5F96A8A5-7658-F740-99A3-479C3CA8D23D}" dt="2020-09-17T07:54:39.449" v="1" actId="2696"/>
-        <pc:sldMkLst>
-          <pc:docMk/>
-          <pc:sldMk cId="2625469064" sldId="1209"/>
-        </pc:sldMkLst>
-      </pc:sldChg>
-      <pc:sldChg chg="del">
-        <pc:chgData name="Július Baráth" userId="e650c4ab-697e-4750-bd58-c1531aabce95" providerId="ADAL" clId="{5F96A8A5-7658-F740-99A3-479C3CA8D23D}" dt="2020-09-17T07:57:10.744" v="16" actId="2696"/>
-        <pc:sldMkLst>
-          <pc:docMk/>
-          <pc:sldMk cId="1440091131" sldId="1278"/>
-        </pc:sldMkLst>
-      </pc:sldChg>
-      <pc:sldChg chg="del">
-        <pc:chgData name="Július Baráth" userId="e650c4ab-697e-4750-bd58-c1531aabce95" providerId="ADAL" clId="{5F96A8A5-7658-F740-99A3-479C3CA8D23D}" dt="2020-09-17T07:56:38.584" v="10" actId="2696"/>
-        <pc:sldMkLst>
-          <pc:docMk/>
-          <pc:sldMk cId="3228949190" sldId="1299"/>
-        </pc:sldMkLst>
-      </pc:sldChg>
-      <pc:sldChg chg="del">
-        <pc:chgData name="Július Baráth" userId="e650c4ab-697e-4750-bd58-c1531aabce95" providerId="ADAL" clId="{5F96A8A5-7658-F740-99A3-479C3CA8D23D}" dt="2020-09-17T07:57:10.751" v="17" actId="2696"/>
-        <pc:sldMkLst>
-          <pc:docMk/>
-          <pc:sldMk cId="4065885206" sldId="1308"/>
-        </pc:sldMkLst>
-      </pc:sldChg>
-      <pc:sldChg chg="del">
-        <pc:chgData name="Július Baráth" userId="e650c4ab-697e-4750-bd58-c1531aabce95" providerId="ADAL" clId="{5F96A8A5-7658-F740-99A3-479C3CA8D23D}" dt="2020-09-17T07:57:10.730" v="14" actId="2696"/>
-        <pc:sldMkLst>
-          <pc:docMk/>
-          <pc:sldMk cId="1409324011" sldId="1309"/>
-        </pc:sldMkLst>
-      </pc:sldChg>
-      <pc:sldChg chg="del">
-        <pc:chgData name="Július Baráth" userId="e650c4ab-697e-4750-bd58-c1531aabce95" providerId="ADAL" clId="{5F96A8A5-7658-F740-99A3-479C3CA8D23D}" dt="2020-09-17T07:57:10.737" v="15" actId="2696"/>
-        <pc:sldMkLst>
-          <pc:docMk/>
-          <pc:sldMk cId="2701219303" sldId="1310"/>
-        </pc:sldMkLst>
-      </pc:sldChg>
-      <pc:sldChg chg="del">
-        <pc:chgData name="Július Baráth" userId="e650c4ab-697e-4750-bd58-c1531aabce95" providerId="ADAL" clId="{5F96A8A5-7658-F740-99A3-479C3CA8D23D}" dt="2020-09-17T07:54:39.500" v="5" actId="2696"/>
-        <pc:sldMkLst>
-          <pc:docMk/>
-          <pc:sldMk cId="810146878" sldId="1311"/>
-        </pc:sldMkLst>
-      </pc:sldChg>
-      <pc:sldChg chg="del">
-        <pc:chgData name="Július Baráth" userId="e650c4ab-697e-4750-bd58-c1531aabce95" providerId="ADAL" clId="{5F96A8A5-7658-F740-99A3-479C3CA8D23D}" dt="2020-09-17T07:54:39.527" v="7" actId="2696"/>
-        <pc:sldMkLst>
-          <pc:docMk/>
-          <pc:sldMk cId="3125377908" sldId="1361"/>
-        </pc:sldMkLst>
-      </pc:sldChg>
-      <pc:sldChg chg="del">
-        <pc:chgData name="Július Baráth" userId="e650c4ab-697e-4750-bd58-c1531aabce95" providerId="ADAL" clId="{5F96A8A5-7658-F740-99A3-479C3CA8D23D}" dt="2020-09-17T07:54:39.514" v="6" actId="2696"/>
-        <pc:sldMkLst>
-          <pc:docMk/>
-          <pc:sldMk cId="218268727" sldId="1362"/>
-        </pc:sldMkLst>
-      </pc:sldChg>
-    </pc:docChg>
-  </pc:docChgLst>
-  <pc:docChgLst>
-    <pc:chgData name="Baráth, Július" userId="aebde9b9-dccc-4475-a9ac-c05e78323d7a" providerId="ADAL" clId="{996C9B10-38B7-5E44-8BE6-B4DCE20BD25B}"/>
-    <pc:docChg chg="addSld modSld">
-      <pc:chgData name="Baráth, Július" userId="aebde9b9-dccc-4475-a9ac-c05e78323d7a" providerId="ADAL" clId="{996C9B10-38B7-5E44-8BE6-B4DCE20BD25B}" dt="2024-10-07T07:32:15.602" v="21" actId="1076"/>
-      <pc:docMkLst>
-        <pc:docMk/>
-      </pc:docMkLst>
-      <pc:sldChg chg="modSp mod">
-        <pc:chgData name="Baráth, Július" userId="aebde9b9-dccc-4475-a9ac-c05e78323d7a" providerId="ADAL" clId="{996C9B10-38B7-5E44-8BE6-B4DCE20BD25B}" dt="2024-10-07T07:32:15.602" v="21" actId="1076"/>
-        <pc:sldMkLst>
-          <pc:docMk/>
-          <pc:sldMk cId="1255502005" sldId="1287"/>
-        </pc:sldMkLst>
-        <pc:spChg chg="mod">
-          <ac:chgData name="Baráth, Július" userId="aebde9b9-dccc-4475-a9ac-c05e78323d7a" providerId="ADAL" clId="{996C9B10-38B7-5E44-8BE6-B4DCE20BD25B}" dt="2024-10-07T07:32:15.602" v="21" actId="1076"/>
-          <ac:spMkLst>
-            <pc:docMk/>
-            <pc:sldMk cId="1255502005" sldId="1287"/>
-            <ac:spMk id="4" creationId="{DA4662F3-9D2E-0F4A-9CA4-8E097D17AA67}"/>
-          </ac:spMkLst>
-        </pc:spChg>
-      </pc:sldChg>
-      <pc:sldChg chg="addSp delSp modSp new mod">
-        <pc:chgData name="Baráth, Július" userId="aebde9b9-dccc-4475-a9ac-c05e78323d7a" providerId="ADAL" clId="{996C9B10-38B7-5E44-8BE6-B4DCE20BD25B}" dt="2024-10-07T06:56:28.406" v="6" actId="14100"/>
-        <pc:sldMkLst>
-          <pc:docMk/>
-          <pc:sldMk cId="1445707400" sldId="1308"/>
-        </pc:sldMkLst>
-        <pc:graphicFrameChg chg="add mod">
-          <ac:chgData name="Baráth, Július" userId="aebde9b9-dccc-4475-a9ac-c05e78323d7a" providerId="ADAL" clId="{996C9B10-38B7-5E44-8BE6-B4DCE20BD25B}" dt="2024-10-07T06:56:28.406" v="6" actId="14100"/>
-          <ac:graphicFrameMkLst>
-            <pc:docMk/>
-            <pc:sldMk cId="1445707400" sldId="1308"/>
-            <ac:graphicFrameMk id="4" creationId="{EC6D300A-228E-B3A2-C889-8EE7BD7469F7}"/>
-          </ac:graphicFrameMkLst>
-        </pc:graphicFrameChg>
-      </pc:sldChg>
-      <pc:sldChg chg="addSp delSp modSp new mod">
-        <pc:chgData name="Baráth, Július" userId="aebde9b9-dccc-4475-a9ac-c05e78323d7a" providerId="ADAL" clId="{996C9B10-38B7-5E44-8BE6-B4DCE20BD25B}" dt="2024-10-07T06:57:48.116" v="13" actId="14100"/>
-        <pc:sldMkLst>
-          <pc:docMk/>
-          <pc:sldMk cId="547815551" sldId="1309"/>
-        </pc:sldMkLst>
-        <pc:graphicFrameChg chg="add mod">
-          <ac:chgData name="Baráth, Július" userId="aebde9b9-dccc-4475-a9ac-c05e78323d7a" providerId="ADAL" clId="{996C9B10-38B7-5E44-8BE6-B4DCE20BD25B}" dt="2024-10-07T06:57:48.116" v="13" actId="14100"/>
-          <ac:graphicFrameMkLst>
-            <pc:docMk/>
-            <pc:sldMk cId="547815551" sldId="1309"/>
-            <ac:graphicFrameMk id="4" creationId="{FE077794-7F81-5079-3A51-45BB09F71CC1}"/>
-          </ac:graphicFrameMkLst>
-        </pc:graphicFrameChg>
-      </pc:sldChg>
-      <pc:sldChg chg="addSp delSp modSp new mod">
-        <pc:chgData name="Baráth, Július" userId="aebde9b9-dccc-4475-a9ac-c05e78323d7a" providerId="ADAL" clId="{996C9B10-38B7-5E44-8BE6-B4DCE20BD25B}" dt="2024-10-07T06:58:48.266" v="20" actId="14100"/>
-        <pc:sldMkLst>
-          <pc:docMk/>
-          <pc:sldMk cId="1059799677" sldId="1310"/>
-        </pc:sldMkLst>
-        <pc:graphicFrameChg chg="add mod">
-          <ac:chgData name="Baráth, Július" userId="aebde9b9-dccc-4475-a9ac-c05e78323d7a" providerId="ADAL" clId="{996C9B10-38B7-5E44-8BE6-B4DCE20BD25B}" dt="2024-10-07T06:58:48.266" v="20" actId="14100"/>
-          <ac:graphicFrameMkLst>
-            <pc:docMk/>
-            <pc:sldMk cId="1059799677" sldId="1310"/>
-            <ac:graphicFrameMk id="4" creationId="{EAF3DACC-7763-7CBD-132E-7C0711C35C6B}"/>
-          </ac:graphicFrameMkLst>
-        </pc:graphicFrameChg>
-      </pc:sldChg>
-    </pc:docChg>
-  </pc:docChgLst>
-  <pc:docChgLst>
-    <pc:chgData name="Július Baráth" userId="e650c4ab-697e-4750-bd58-c1531aabce95" providerId="ADAL" clId="{3F669D94-CAB1-C148-942F-70A19BCF74D0}"/>
-    <pc:docChg chg="custSel modSld">
-      <pc:chgData name="Július Baráth" userId="e650c4ab-697e-4750-bd58-c1531aabce95" providerId="ADAL" clId="{3F669D94-CAB1-C148-942F-70A19BCF74D0}" dt="2022-01-05T09:17:49.885" v="9" actId="27636"/>
-      <pc:docMkLst>
-        <pc:docMk/>
-      </pc:docMkLst>
-      <pc:sldChg chg="modSp mod">
-        <pc:chgData name="Július Baráth" userId="e650c4ab-697e-4750-bd58-c1531aabce95" providerId="ADAL" clId="{3F669D94-CAB1-C148-942F-70A19BCF74D0}" dt="2022-01-05T09:17:49.885" v="9" actId="27636"/>
-        <pc:sldMkLst>
-          <pc:docMk/>
-          <pc:sldMk cId="1255502005" sldId="1287"/>
-        </pc:sldMkLst>
       </pc:sldChg>
     </pc:docChg>
   </pc:docChgLst>
@@ -721,7 +407,7 @@
           <a:p>
             <a:fld id="{136337D9-3022-3D41-8D8A-BDF2F3B0DD8E}" type="datetimeFigureOut">
               <a:rPr lang="en-US" smtClean="0"/>
-              <a:t>11/21/24</a:t>
+              <a:t>11/6/25</a:t>
             </a:fld>
             <a:endParaRPr lang="en-US" dirty="0"/>
           </a:p>
@@ -28090,6 +27776,172 @@
           </a:prstGeom>
         </p:spPr>
       </p:pic>
+      <p:sp>
+        <p:nvSpPr>
+          <p:cNvPr id="2" name="BlokTextu 1">
+            <a:extLst>
+              <a:ext uri="{FF2B5EF4-FFF2-40B4-BE49-F238E27FC236}">
+                <a16:creationId xmlns:a16="http://schemas.microsoft.com/office/drawing/2014/main" id="{5E387964-7AD4-E343-04B4-07CA40FB197F}"/>
+              </a:ext>
+            </a:extLst>
+          </p:cNvPr>
+          <p:cNvSpPr txBox="1"/>
+          <p:nvPr/>
+        </p:nvSpPr>
+        <p:spPr>
+          <a:xfrm>
+            <a:off x="5602884" y="4170130"/>
+            <a:ext cx="1677371" cy="646331"/>
+          </a:xfrm>
+          <a:prstGeom prst="rect">
+            <a:avLst/>
+          </a:prstGeom>
+          <a:noFill/>
+          <a:ln>
+            <a:solidFill>
+              <a:srgbClr val="000000"/>
+            </a:solidFill>
+          </a:ln>
+        </p:spPr>
+        <p:txBody>
+          <a:bodyPr wrap="square" rtlCol="0">
+            <a:spAutoFit/>
+          </a:bodyPr>
+          <a:lstStyle/>
+          <a:p>
+            <a:r>
+              <a:rPr lang="sk-SK" dirty="0"/>
+              <a:t>Management </a:t>
+            </a:r>
+            <a:r>
+              <a:rPr lang="sk-SK" dirty="0" err="1"/>
+              <a:t>console</a:t>
+            </a:r>
+            <a:endParaRPr lang="sk-SK" dirty="0"/>
+          </a:p>
+        </p:txBody>
+      </p:sp>
+      <p:cxnSp>
+        <p:nvCxnSpPr>
+          <p:cNvPr id="6" name="Rovná spojovacia šípka 5">
+            <a:extLst>
+              <a:ext uri="{FF2B5EF4-FFF2-40B4-BE49-F238E27FC236}">
+                <a16:creationId xmlns:a16="http://schemas.microsoft.com/office/drawing/2014/main" id="{A4620A5F-2882-DE8B-ED5A-CB4A275EC1F8}"/>
+              </a:ext>
+            </a:extLst>
+          </p:cNvPr>
+          <p:cNvCxnSpPr/>
+          <p:nvPr/>
+        </p:nvCxnSpPr>
+        <p:spPr>
+          <a:xfrm flipH="1">
+            <a:off x="6162008" y="2085065"/>
+            <a:ext cx="576596" cy="2085065"/>
+          </a:xfrm>
+          <a:prstGeom prst="straightConnector1">
+            <a:avLst/>
+          </a:prstGeom>
+          <a:ln>
+            <a:tailEnd type="triangle"/>
+          </a:ln>
+        </p:spPr>
+        <p:style>
+          <a:lnRef idx="1">
+            <a:schemeClr val="accent1"/>
+          </a:lnRef>
+          <a:fillRef idx="0">
+            <a:schemeClr val="accent1"/>
+          </a:fillRef>
+          <a:effectRef idx="0">
+            <a:schemeClr val="accent1"/>
+          </a:effectRef>
+          <a:fontRef idx="minor">
+            <a:schemeClr val="tx1"/>
+          </a:fontRef>
+        </p:style>
+      </p:cxnSp>
+      <p:cxnSp>
+        <p:nvCxnSpPr>
+          <p:cNvPr id="9" name="Rovná spojovacia šípka 8">
+            <a:extLst>
+              <a:ext uri="{FF2B5EF4-FFF2-40B4-BE49-F238E27FC236}">
+                <a16:creationId xmlns:a16="http://schemas.microsoft.com/office/drawing/2014/main" id="{08D02B1F-F53F-4ACB-3DE0-59DDA2D6B4D2}"/>
+              </a:ext>
+            </a:extLst>
+          </p:cNvPr>
+          <p:cNvCxnSpPr/>
+          <p:nvPr/>
+        </p:nvCxnSpPr>
+        <p:spPr>
+          <a:xfrm flipH="1">
+            <a:off x="6266843" y="3605182"/>
+            <a:ext cx="500882" cy="564948"/>
+          </a:xfrm>
+          <a:prstGeom prst="straightConnector1">
+            <a:avLst/>
+          </a:prstGeom>
+          <a:ln>
+            <a:tailEnd type="triangle"/>
+          </a:ln>
+        </p:spPr>
+        <p:style>
+          <a:lnRef idx="1">
+            <a:schemeClr val="accent1"/>
+          </a:lnRef>
+          <a:fillRef idx="0">
+            <a:schemeClr val="accent1"/>
+          </a:fillRef>
+          <a:effectRef idx="0">
+            <a:schemeClr val="accent1"/>
+          </a:effectRef>
+          <a:fontRef idx="minor">
+            <a:schemeClr val="tx1"/>
+          </a:fontRef>
+        </p:style>
+      </p:cxnSp>
+      <p:sp>
+        <p:nvSpPr>
+          <p:cNvPr id="10" name="BlokTextu 9">
+            <a:extLst>
+              <a:ext uri="{FF2B5EF4-FFF2-40B4-BE49-F238E27FC236}">
+                <a16:creationId xmlns:a16="http://schemas.microsoft.com/office/drawing/2014/main" id="{68AA0D44-1EA9-1DEE-A8AC-0F77623B4A55}"/>
+              </a:ext>
+            </a:extLst>
+          </p:cNvPr>
+          <p:cNvSpPr txBox="1"/>
+          <p:nvPr/>
+        </p:nvSpPr>
+        <p:spPr>
+          <a:xfrm>
+            <a:off x="786267" y="4631795"/>
+            <a:ext cx="4676836" cy="369332"/>
+          </a:xfrm>
+          <a:prstGeom prst="rect">
+            <a:avLst/>
+          </a:prstGeom>
+          <a:noFill/>
+        </p:spPr>
+        <p:txBody>
+          <a:bodyPr wrap="square" rtlCol="0">
+            <a:spAutoFit/>
+          </a:bodyPr>
+          <a:lstStyle/>
+          <a:p>
+            <a:r>
+              <a:rPr lang="sk-SK" i="1" dirty="0"/>
+              <a:t>Existuje aj virtualizácia aplikácií – </a:t>
+            </a:r>
+            <a:r>
+              <a:rPr lang="sk-SK" i="1" dirty="0" err="1"/>
+              <a:t>docker</a:t>
+            </a:r>
+            <a:r>
+              <a:rPr lang="sk-SK" i="1" dirty="0"/>
+              <a:t> ...</a:t>
+            </a:r>
+          </a:p>
+        </p:txBody>
+      </p:sp>
     </p:spTree>
     <p:custDataLst>
       <p:tags r:id="rId1"/>
@@ -31603,6 +31455,58 @@
             </a:r>
           </a:p>
           <a:p>
+            <a:pPr marL="358775" lvl="2" indent="-285750" defTabSz="457105" fontAlgn="auto">
+              <a:lnSpc>
+                <a:spcPct val="100000"/>
+              </a:lnSpc>
+              <a:spcBef>
+                <a:spcPct val="20000"/>
+              </a:spcBef>
+              <a:spcAft>
+                <a:spcPts val="0"/>
+              </a:spcAft>
+              <a:buFont typeface="Arial" panose="020B0604020202020204" pitchFamily="34" charset="0"/>
+              <a:buChar char="•"/>
+            </a:pPr>
+            <a:r>
+              <a:rPr lang="sk-SK" sz="900" dirty="0" err="1">
+                <a:solidFill>
+                  <a:srgbClr val="000000"/>
+                </a:solidFill>
+              </a:rPr>
+              <a:t>OpenFlow</a:t>
+            </a:r>
+            <a:r>
+              <a:rPr lang="sk-SK" sz="900" dirty="0">
+                <a:solidFill>
+                  <a:srgbClr val="000000"/>
+                </a:solidFill>
+              </a:rPr>
+              <a:t> je komunikačný protokol používaný v kontexte SDN. Jeho hlavnou úlohou je umožniť centrálnemu </a:t>
+            </a:r>
+            <a:r>
+              <a:rPr lang="sk-SK" sz="900" dirty="0" err="1">
+                <a:solidFill>
+                  <a:srgbClr val="000000"/>
+                </a:solidFill>
+              </a:rPr>
+              <a:t>kontroléru</a:t>
+            </a:r>
+            <a:r>
+              <a:rPr lang="sk-SK" sz="900" dirty="0">
+                <a:solidFill>
+                  <a:srgbClr val="000000"/>
+                </a:solidFill>
+              </a:rPr>
+              <a:t> SDN priamo riadiť správanie sieťových zariadení, ako sú prepínače a smerovače.</a:t>
+            </a:r>
+            <a:endParaRPr lang="en-US" sz="900" dirty="0">
+              <a:solidFill>
+                <a:srgbClr val="000000"/>
+              </a:solidFill>
+            </a:endParaRPr>
+          </a:p>
+          <a:p>
             <a:pPr marL="285750" indent="-285750" algn="l">
               <a:buFont typeface="Arial" panose="020B0604020202020204" pitchFamily="34" charset="0"/>
               <a:buChar char="•"/>
@@ -31637,7 +31541,341 @@
                   <a:srgbClr val="000000"/>
                 </a:solidFill>
               </a:rPr>
-              <a:t>. Orchestration in networking is the process of automating the provisioning of network components such as servers, storage, switches, routers, and applications. </a:t>
+              <a:t>. Orchestration in networking is the process of automating the provisioning of network components such as servers, storage, switches, routers, and applications.</a:t>
+            </a:r>
+          </a:p>
+          <a:p>
+            <a:pPr marL="358835" lvl="1" indent="-285750">
+              <a:buFont typeface="Arial" panose="020B0604020202020204" pitchFamily="34" charset="0"/>
+              <a:buChar char="•"/>
+            </a:pPr>
+            <a:r>
+              <a:rPr lang="en-US" sz="900" dirty="0">
+                <a:solidFill>
+                  <a:srgbClr val="000000"/>
+                </a:solidFill>
+              </a:rPr>
+              <a:t>OpenStack </a:t>
+            </a:r>
+            <a:r>
+              <a:rPr lang="en-US" sz="900" dirty="0" err="1">
+                <a:solidFill>
+                  <a:srgbClr val="000000"/>
+                </a:solidFill>
+              </a:rPr>
+              <a:t>definovaný</a:t>
+            </a:r>
+            <a:r>
+              <a:rPr lang="en-US" sz="900" dirty="0">
+                <a:solidFill>
+                  <a:srgbClr val="000000"/>
+                </a:solidFill>
+              </a:rPr>
+              <a:t> </a:t>
+            </a:r>
+            <a:r>
+              <a:rPr lang="en-US" sz="900" dirty="0" err="1">
+                <a:solidFill>
+                  <a:srgbClr val="000000"/>
+                </a:solidFill>
+              </a:rPr>
+              <a:t>ako</a:t>
+            </a:r>
+            <a:r>
+              <a:rPr lang="en-US" sz="900" dirty="0">
+                <a:solidFill>
+                  <a:srgbClr val="000000"/>
+                </a:solidFill>
+              </a:rPr>
+              <a:t> </a:t>
+            </a:r>
+            <a:r>
+              <a:rPr lang="en-US" sz="900" dirty="0" err="1">
+                <a:solidFill>
+                  <a:srgbClr val="000000"/>
+                </a:solidFill>
+              </a:rPr>
+              <a:t>platforma</a:t>
+            </a:r>
+            <a:r>
+              <a:rPr lang="en-US" sz="900" dirty="0">
+                <a:solidFill>
+                  <a:srgbClr val="000000"/>
+                </a:solidFill>
+              </a:rPr>
+              <a:t> pre </a:t>
+            </a:r>
+            <a:r>
+              <a:rPr lang="en-US" sz="900" dirty="0" err="1">
+                <a:solidFill>
+                  <a:srgbClr val="000000"/>
+                </a:solidFill>
+              </a:rPr>
+              <a:t>správu</a:t>
+            </a:r>
+            <a:r>
+              <a:rPr lang="en-US" sz="900" dirty="0">
+                <a:solidFill>
+                  <a:srgbClr val="000000"/>
+                </a:solidFill>
+              </a:rPr>
+              <a:t> </a:t>
+            </a:r>
+            <a:r>
+              <a:rPr lang="en-US" sz="900" dirty="0" err="1">
+                <a:solidFill>
+                  <a:srgbClr val="000000"/>
+                </a:solidFill>
+              </a:rPr>
+              <a:t>cloudovej</a:t>
+            </a:r>
+            <a:r>
+              <a:rPr lang="en-US" sz="900" dirty="0">
+                <a:solidFill>
+                  <a:srgbClr val="000000"/>
+                </a:solidFill>
+              </a:rPr>
+              <a:t> </a:t>
+            </a:r>
+            <a:r>
+              <a:rPr lang="en-US" sz="900" dirty="0" err="1">
+                <a:solidFill>
+                  <a:srgbClr val="000000"/>
+                </a:solidFill>
+              </a:rPr>
+              <a:t>infraštruktúry</a:t>
+            </a:r>
+            <a:r>
+              <a:rPr lang="en-US" sz="900" dirty="0">
+                <a:solidFill>
+                  <a:srgbClr val="000000"/>
+                </a:solidFill>
+              </a:rPr>
+              <a:t>, </a:t>
+            </a:r>
+            <a:r>
+              <a:rPr lang="en-US" sz="900" dirty="0" err="1">
+                <a:solidFill>
+                  <a:srgbClr val="000000"/>
+                </a:solidFill>
+              </a:rPr>
+              <a:t>ktorá</a:t>
+            </a:r>
+            <a:r>
+              <a:rPr lang="en-US" sz="900" dirty="0">
+                <a:solidFill>
+                  <a:srgbClr val="000000"/>
+                </a:solidFill>
+              </a:rPr>
+              <a:t> </a:t>
+            </a:r>
+            <a:r>
+              <a:rPr lang="en-US" sz="900" dirty="0" err="1">
+                <a:solidFill>
+                  <a:srgbClr val="000000"/>
+                </a:solidFill>
+              </a:rPr>
+              <a:t>môže</a:t>
+            </a:r>
+            <a:r>
+              <a:rPr lang="en-US" sz="900" dirty="0">
+                <a:solidFill>
+                  <a:srgbClr val="000000"/>
+                </a:solidFill>
+              </a:rPr>
+              <a:t> </a:t>
+            </a:r>
+            <a:r>
+              <a:rPr lang="en-US" sz="900" dirty="0" err="1">
+                <a:solidFill>
+                  <a:srgbClr val="000000"/>
+                </a:solidFill>
+              </a:rPr>
+              <a:t>úzko</a:t>
+            </a:r>
+            <a:r>
+              <a:rPr lang="en-US" sz="900" dirty="0">
+                <a:solidFill>
+                  <a:srgbClr val="000000"/>
+                </a:solidFill>
+              </a:rPr>
+              <a:t> </a:t>
+            </a:r>
+            <a:r>
+              <a:rPr lang="en-US" sz="900" dirty="0" err="1">
+                <a:solidFill>
+                  <a:srgbClr val="000000"/>
+                </a:solidFill>
+              </a:rPr>
+              <a:t>spolupracovať</a:t>
+            </a:r>
+            <a:r>
+              <a:rPr lang="en-US" sz="900" dirty="0">
+                <a:solidFill>
+                  <a:srgbClr val="000000"/>
+                </a:solidFill>
+              </a:rPr>
+              <a:t> so SDN </a:t>
+            </a:r>
+            <a:r>
+              <a:rPr lang="en-US" sz="900" dirty="0" err="1">
+                <a:solidFill>
+                  <a:srgbClr val="000000"/>
+                </a:solidFill>
+              </a:rPr>
+              <a:t>technológiami</a:t>
+            </a:r>
+            <a:r>
+              <a:rPr lang="en-US" sz="900" dirty="0">
+                <a:solidFill>
+                  <a:srgbClr val="000000"/>
+                </a:solidFill>
+              </a:rPr>
+              <a:t> (</a:t>
+            </a:r>
+            <a:r>
+              <a:rPr lang="en-US" sz="900" dirty="0" err="1">
+                <a:solidFill>
+                  <a:srgbClr val="000000"/>
+                </a:solidFill>
+              </a:rPr>
+              <a:t>napr</a:t>
+            </a:r>
+            <a:r>
+              <a:rPr lang="en-US" sz="900" dirty="0">
+                <a:solidFill>
+                  <a:srgbClr val="000000"/>
+                </a:solidFill>
+              </a:rPr>
+              <a:t>. OpenFlow) </a:t>
+            </a:r>
+            <a:r>
+              <a:rPr lang="en-US" sz="900" dirty="0" err="1">
+                <a:solidFill>
+                  <a:srgbClr val="000000"/>
+                </a:solidFill>
+              </a:rPr>
+              <a:t>na</a:t>
+            </a:r>
+            <a:r>
+              <a:rPr lang="en-US" sz="900" dirty="0">
+                <a:solidFill>
+                  <a:srgbClr val="000000"/>
+                </a:solidFill>
+              </a:rPr>
+              <a:t> </a:t>
+            </a:r>
+            <a:r>
+              <a:rPr lang="en-US" sz="900" dirty="0" err="1">
+                <a:solidFill>
+                  <a:srgbClr val="000000"/>
+                </a:solidFill>
+              </a:rPr>
+              <a:t>riadenie</a:t>
+            </a:r>
+            <a:r>
+              <a:rPr lang="en-US" sz="900" dirty="0">
+                <a:solidFill>
+                  <a:srgbClr val="000000"/>
+                </a:solidFill>
+              </a:rPr>
+              <a:t> </a:t>
+            </a:r>
+            <a:r>
+              <a:rPr lang="en-US" sz="900" dirty="0" err="1">
+                <a:solidFill>
+                  <a:srgbClr val="000000"/>
+                </a:solidFill>
+              </a:rPr>
+              <a:t>sieťovej</a:t>
+            </a:r>
+            <a:r>
+              <a:rPr lang="en-US" sz="900" dirty="0">
+                <a:solidFill>
+                  <a:srgbClr val="000000"/>
+                </a:solidFill>
+              </a:rPr>
+              <a:t> </a:t>
+            </a:r>
+            <a:r>
+              <a:rPr lang="en-US" sz="900" dirty="0" err="1">
+                <a:solidFill>
+                  <a:srgbClr val="000000"/>
+                </a:solidFill>
+              </a:rPr>
+              <a:t>konektivity</a:t>
+            </a:r>
+            <a:r>
+              <a:rPr lang="en-US" sz="900" dirty="0">
+                <a:solidFill>
+                  <a:srgbClr val="000000"/>
+                </a:solidFill>
+              </a:rPr>
+              <a:t> </a:t>
+            </a:r>
+            <a:r>
+              <a:rPr lang="en-US" sz="900" dirty="0" err="1">
+                <a:solidFill>
+                  <a:srgbClr val="000000"/>
+                </a:solidFill>
+              </a:rPr>
+              <a:t>medzi</a:t>
+            </a:r>
+            <a:r>
+              <a:rPr lang="en-US" sz="900" dirty="0">
+                <a:solidFill>
+                  <a:srgbClr val="000000"/>
+                </a:solidFill>
+              </a:rPr>
+              <a:t> </a:t>
+            </a:r>
+            <a:r>
+              <a:rPr lang="en-US" sz="900" dirty="0" err="1">
+                <a:solidFill>
+                  <a:srgbClr val="000000"/>
+                </a:solidFill>
+              </a:rPr>
+              <a:t>virtuálnymi</a:t>
+            </a:r>
+            <a:r>
+              <a:rPr lang="en-US" sz="900" dirty="0">
+                <a:solidFill>
+                  <a:srgbClr val="000000"/>
+                </a:solidFill>
+              </a:rPr>
+              <a:t> </a:t>
+            </a:r>
+            <a:r>
+              <a:rPr lang="en-US" sz="900" dirty="0" err="1">
+                <a:solidFill>
+                  <a:srgbClr val="000000"/>
+                </a:solidFill>
+              </a:rPr>
+              <a:t>strojmi</a:t>
+            </a:r>
+            <a:r>
+              <a:rPr lang="en-US" sz="900" dirty="0">
+                <a:solidFill>
+                  <a:srgbClr val="000000"/>
+                </a:solidFill>
+              </a:rPr>
+              <a:t> a </a:t>
+            </a:r>
+            <a:r>
+              <a:rPr lang="en-US" sz="900" dirty="0" err="1">
+                <a:solidFill>
+                  <a:srgbClr val="000000"/>
+                </a:solidFill>
+              </a:rPr>
+              <a:t>službami</a:t>
+            </a:r>
+            <a:r>
+              <a:rPr lang="en-US" sz="900" dirty="0">
+                <a:solidFill>
+                  <a:srgbClr val="000000"/>
+                </a:solidFill>
+              </a:rPr>
+              <a:t>.</a:t>
             </a:r>
           </a:p>
           <a:p>
@@ -35275,7 +35513,18 @@
                   <a:srgbClr val="000000"/>
                 </a:solidFill>
               </a:rPr>
-              <a:t>Data centers are the physical facilities that provide the compute, network, and storage needs of cloud computing services. Cloud service providers use data centers to host their cloud services and cloud-based resources.</a:t>
+              <a:t>Data centers are the physical facilities that provide the compute, network, and storage needs of cloud computing services. </a:t>
+            </a:r>
+          </a:p>
+          <a:p>
+            <a:pPr marL="0" indent="0" algn="l"/>
+            <a:r>
+              <a:rPr lang="en-US" sz="1600" dirty="0">
+                <a:solidFill>
+                  <a:srgbClr val="000000"/>
+                </a:solidFill>
+              </a:rPr>
+              <a:t>Cloud service providers use data centers to host their cloud services and cloud-based resources.</a:t>
             </a:r>
           </a:p>
           <a:p>

</xml_diff>